<commit_message>
Exported and updated doc to .pdf
</commit_message>
<xml_diff>
--- a/src/Analysis/AnalysisAndReadMe-2nd iteration.pptx
+++ b/src/Analysis/AnalysisAndReadMe-2nd iteration.pptx
@@ -250,7 +250,7 @@
           <a:p>
             <a:fld id="{F5E23FCC-39EC-48A2-B1E4-4F652D5BAD1A}" type="datetimeFigureOut">
               <a:rPr lang="en-US" smtClean="0"/>
-              <a:t>1/27/2017</a:t>
+              <a:t>27-Jan-17</a:t>
             </a:fld>
             <a:endParaRPr lang="en-US"/>
           </a:p>
@@ -418,7 +418,7 @@
           <a:p>
             <a:fld id="{F5E23FCC-39EC-48A2-B1E4-4F652D5BAD1A}" type="datetimeFigureOut">
               <a:rPr lang="en-US" smtClean="0"/>
-              <a:t>1/27/2017</a:t>
+              <a:t>27-Jan-17</a:t>
             </a:fld>
             <a:endParaRPr lang="en-US"/>
           </a:p>
@@ -596,7 +596,7 @@
           <a:p>
             <a:fld id="{F5E23FCC-39EC-48A2-B1E4-4F652D5BAD1A}" type="datetimeFigureOut">
               <a:rPr lang="en-US" smtClean="0"/>
-              <a:t>1/27/2017</a:t>
+              <a:t>27-Jan-17</a:t>
             </a:fld>
             <a:endParaRPr lang="en-US"/>
           </a:p>
@@ -764,7 +764,7 @@
           <a:p>
             <a:fld id="{F5E23FCC-39EC-48A2-B1E4-4F652D5BAD1A}" type="datetimeFigureOut">
               <a:rPr lang="en-US" smtClean="0"/>
-              <a:t>1/27/2017</a:t>
+              <a:t>27-Jan-17</a:t>
             </a:fld>
             <a:endParaRPr lang="en-US"/>
           </a:p>
@@ -1009,7 +1009,7 @@
           <a:p>
             <a:fld id="{F5E23FCC-39EC-48A2-B1E4-4F652D5BAD1A}" type="datetimeFigureOut">
               <a:rPr lang="en-US" smtClean="0"/>
-              <a:t>1/27/2017</a:t>
+              <a:t>27-Jan-17</a:t>
             </a:fld>
             <a:endParaRPr lang="en-US"/>
           </a:p>
@@ -1238,7 +1238,7 @@
           <a:p>
             <a:fld id="{F5E23FCC-39EC-48A2-B1E4-4F652D5BAD1A}" type="datetimeFigureOut">
               <a:rPr lang="en-US" smtClean="0"/>
-              <a:t>1/27/2017</a:t>
+              <a:t>27-Jan-17</a:t>
             </a:fld>
             <a:endParaRPr lang="en-US"/>
           </a:p>
@@ -1602,7 +1602,7 @@
           <a:p>
             <a:fld id="{F5E23FCC-39EC-48A2-B1E4-4F652D5BAD1A}" type="datetimeFigureOut">
               <a:rPr lang="en-US" smtClean="0"/>
-              <a:t>1/27/2017</a:t>
+              <a:t>27-Jan-17</a:t>
             </a:fld>
             <a:endParaRPr lang="en-US"/>
           </a:p>
@@ -1719,7 +1719,7 @@
           <a:p>
             <a:fld id="{F5E23FCC-39EC-48A2-B1E4-4F652D5BAD1A}" type="datetimeFigureOut">
               <a:rPr lang="en-US" smtClean="0"/>
-              <a:t>1/27/2017</a:t>
+              <a:t>27-Jan-17</a:t>
             </a:fld>
             <a:endParaRPr lang="en-US"/>
           </a:p>
@@ -1814,7 +1814,7 @@
           <a:p>
             <a:fld id="{F5E23FCC-39EC-48A2-B1E4-4F652D5BAD1A}" type="datetimeFigureOut">
               <a:rPr lang="en-US" smtClean="0"/>
-              <a:t>1/27/2017</a:t>
+              <a:t>27-Jan-17</a:t>
             </a:fld>
             <a:endParaRPr lang="en-US"/>
           </a:p>
@@ -2089,7 +2089,7 @@
           <a:p>
             <a:fld id="{F5E23FCC-39EC-48A2-B1E4-4F652D5BAD1A}" type="datetimeFigureOut">
               <a:rPr lang="en-US" smtClean="0"/>
-              <a:t>1/27/2017</a:t>
+              <a:t>27-Jan-17</a:t>
             </a:fld>
             <a:endParaRPr lang="en-US"/>
           </a:p>
@@ -2341,7 +2341,7 @@
           <a:p>
             <a:fld id="{F5E23FCC-39EC-48A2-B1E4-4F652D5BAD1A}" type="datetimeFigureOut">
               <a:rPr lang="en-US" smtClean="0"/>
-              <a:t>1/27/2017</a:t>
+              <a:t>27-Jan-17</a:t>
             </a:fld>
             <a:endParaRPr lang="en-US"/>
           </a:p>
@@ -2552,7 +2552,7 @@
           <a:p>
             <a:fld id="{F5E23FCC-39EC-48A2-B1E4-4F652D5BAD1A}" type="datetimeFigureOut">
               <a:rPr lang="en-US" smtClean="0"/>
-              <a:t>1/27/2017</a:t>
+              <a:t>27-Jan-17</a:t>
             </a:fld>
             <a:endParaRPr lang="en-US"/>
           </a:p>
@@ -2994,24 +2994,16 @@
               <a:rPr lang="es-ES" dirty="0"/>
             </a:br>
             <a:r>
-              <a:rPr lang="es-ES" sz="4000" dirty="0" smtClean="0"/>
+              <a:rPr lang="es-ES" sz="4000" dirty="0"/>
               <a:t>2nd </a:t>
             </a:r>
             <a:r>
               <a:rPr lang="es-ES" sz="4000" dirty="0" err="1"/>
               <a:t>Iteration</a:t>
-            </a:r>
-            <a:r>
-              <a:rPr lang="es-ES" dirty="0"/>
-              <a:t/>
             </a:r>
             <a:br>
               <a:rPr lang="es-ES" dirty="0"/>
             </a:br>
-            <a:r>
-              <a:rPr lang="es-ES" dirty="0"/>
-              <a:t/>
-            </a:r>
             <a:br>
               <a:rPr lang="es-ES" dirty="0"/>
             </a:br>
@@ -3112,7 +3104,6 @@
               <a:rPr lang="en-US" dirty="0"/>
               <a:t>Main Game Loop </a:t>
             </a:r>
-            <a:endParaRPr lang="en-US" dirty="0" smtClean="0"/>
           </a:p>
           <a:p>
             <a:endParaRPr lang="en-US" dirty="0"/>
@@ -3120,23 +3111,15 @@
           <a:p>
             <a:r>
               <a:rPr lang="en-US" dirty="0"/>
-              <a:t>In its main() </a:t>
-            </a:r>
-            <a:r>
-              <a:rPr lang="en-US" dirty="0" smtClean="0"/>
-              <a:t>the  </a:t>
-            </a:r>
-            <a:r>
-              <a:rPr lang="en-US" dirty="0" err="1" smtClean="0"/>
+              <a:t>In its main() the  </a:t>
+            </a:r>
+            <a:r>
+              <a:rPr lang="en-US" dirty="0" err="1"/>
               <a:t>ControllerFX</a:t>
             </a:r>
             <a:r>
-              <a:rPr lang="en-US" dirty="0" smtClean="0"/>
-              <a:t> </a:t>
-            </a:r>
-            <a:r>
               <a:rPr lang="en-US" dirty="0"/>
-              <a:t>creates all the objects, sets itself as an observer of </a:t>
+              <a:t> creates all the objects, sets itself as an observer of </a:t>
             </a:r>
             <a:r>
               <a:rPr lang="en-US" dirty="0" err="1"/>
@@ -3162,7 +3145,6 @@
               <a:rPr lang="en-US" dirty="0"/>
               <a:t>. </a:t>
             </a:r>
-            <a:endParaRPr lang="en-US" dirty="0" smtClean="0"/>
           </a:p>
           <a:p>
             <a:endParaRPr lang="en-US" dirty="0"/>
@@ -3173,16 +3155,12 @@
               <a:t>Then the </a:t>
             </a:r>
             <a:r>
-              <a:rPr lang="en-US" dirty="0" err="1" smtClean="0"/>
+              <a:rPr lang="en-US" dirty="0" err="1"/>
               <a:t>ControllerFX</a:t>
             </a:r>
             <a:r>
-              <a:rPr lang="en-US" dirty="0" smtClean="0"/>
-              <a:t> </a:t>
-            </a:r>
-            <a:r>
               <a:rPr lang="en-US" dirty="0"/>
-              <a:t>calls </a:t>
+              <a:t> calls </a:t>
             </a:r>
             <a:r>
               <a:rPr lang="en-US" dirty="0" err="1"/>
@@ -3201,12 +3179,8 @@
           </a:p>
           <a:p>
             <a:r>
-              <a:rPr lang="en-US" dirty="0" smtClean="0"/>
-              <a:t>	1 </a:t>
-            </a:r>
-            <a:r>
               <a:rPr lang="en-US" dirty="0"/>
-              <a:t>– </a:t>
+              <a:t>	1 – </a:t>
             </a:r>
             <a:r>
               <a:rPr lang="en-US" dirty="0" err="1"/>
@@ -3224,19 +3198,14 @@
               <a:rPr lang="en-US" dirty="0"/>
               <a:t>. </a:t>
             </a:r>
-            <a:endParaRPr lang="en-US" dirty="0" smtClean="0"/>
           </a:p>
           <a:p>
             <a:endParaRPr lang="en-US" dirty="0"/>
           </a:p>
           <a:p>
             <a:r>
-              <a:rPr lang="en-US" dirty="0" smtClean="0"/>
-              <a:t>	2 </a:t>
-            </a:r>
-            <a:r>
               <a:rPr lang="en-US" dirty="0"/>
-              <a:t>- In its update() </a:t>
+              <a:t>	2 - In its update() </a:t>
             </a:r>
             <a:r>
               <a:rPr lang="en-US" dirty="0" err="1"/>
@@ -3260,37 +3229,24 @@
             </a:r>
             <a:r>
               <a:rPr lang="en-US" dirty="0"/>
-              <a:t>) </a:t>
-            </a:r>
-            <a:r>
-              <a:rPr lang="en-US" dirty="0" smtClean="0"/>
-              <a:t>and calls 		</a:t>
-            </a:r>
-            <a:r>
-              <a:rPr lang="en-US" dirty="0" err="1" smtClean="0"/>
+              <a:t>) and calls 		</a:t>
+            </a:r>
+            <a:r>
+              <a:rPr lang="en-US" dirty="0" err="1"/>
               <a:t>GameState.updateGameState</a:t>
             </a:r>
             <a:r>
-              <a:rPr lang="en-US" dirty="0" smtClean="0"/>
-              <a:t>(Dir</a:t>
-            </a:r>
-            <a:r>
               <a:rPr lang="en-US" dirty="0"/>
-              <a:t>). </a:t>
-            </a:r>
-            <a:endParaRPr lang="en-US" dirty="0" smtClean="0"/>
+              <a:t>(Dir). </a:t>
+            </a:r>
           </a:p>
           <a:p>
             <a:endParaRPr lang="en-US" dirty="0"/>
           </a:p>
           <a:p>
             <a:r>
-              <a:rPr lang="en-US" dirty="0" smtClean="0"/>
-              <a:t>	3 </a:t>
-            </a:r>
-            <a:r>
               <a:rPr lang="en-US" dirty="0"/>
-              <a:t>- In </a:t>
+              <a:t>	3 - In </a:t>
             </a:r>
             <a:r>
               <a:rPr lang="en-US" dirty="0" err="1"/>
@@ -3318,20 +3274,12 @@
             </a:r>
           </a:p>
           <a:p>
-            <a:endParaRPr lang="en-US" dirty="0" smtClean="0"/>
+            <a:endParaRPr lang="en-US" dirty="0"/>
           </a:p>
           <a:p>
             <a:r>
               <a:rPr lang="en-US" dirty="0"/>
-              <a:t>	</a:t>
-            </a:r>
-            <a:r>
-              <a:rPr lang="en-US" dirty="0" smtClean="0"/>
-              <a:t>4 </a:t>
-            </a:r>
-            <a:r>
-              <a:rPr lang="en-US" dirty="0"/>
-              <a:t>- </a:t>
+              <a:t>	4 - </a:t>
             </a:r>
             <a:r>
               <a:rPr lang="en-US" dirty="0" err="1"/>
@@ -3339,27 +3287,19 @@
             </a:r>
             <a:r>
               <a:rPr lang="en-US" dirty="0"/>
-              <a:t> gets a Type[][] copy of the labyrinth as a parameter in its update() and draws the </a:t>
-            </a:r>
-            <a:r>
-              <a:rPr lang="en-US" dirty="0" smtClean="0"/>
-              <a:t>game 	based </a:t>
-            </a:r>
+              <a:t> gets a Type[][] copy of the labyrinth as a parameter in its update() and draws the game 	based on that. </a:t>
+            </a:r>
+          </a:p>
+          <a:p>
+            <a:endParaRPr lang="en-US" dirty="0"/>
+          </a:p>
+          <a:p>
             <a:r>
               <a:rPr lang="en-US" dirty="0"/>
-              <a:t>on that. </a:t>
-            </a:r>
-          </a:p>
-          <a:p>
-            <a:endParaRPr lang="en-US" dirty="0" smtClean="0"/>
-          </a:p>
-          <a:p>
-            <a:r>
-              <a:rPr lang="en-US" dirty="0" smtClean="0"/>
               <a:t>	5 – The </a:t>
             </a:r>
             <a:r>
-              <a:rPr lang="en-US" dirty="0" err="1" smtClean="0"/>
+              <a:rPr lang="en-US" dirty="0" err="1"/>
               <a:t>ControllerFX</a:t>
             </a:r>
             <a:r>
@@ -3372,15 +3312,7 @@
             </a:r>
             <a:r>
               <a:rPr lang="en-US" dirty="0"/>
-              <a:t>() if the conditions for Game Over or Win are met or if the </a:t>
-            </a:r>
-            <a:r>
-              <a:rPr lang="en-US" dirty="0" smtClean="0"/>
-              <a:t>	player types </a:t>
-            </a:r>
-            <a:r>
-              <a:rPr lang="en-US" dirty="0"/>
-              <a:t>“x”. </a:t>
+              <a:t>() if the conditions for Game Over or Win are met or if the 	player types “x”. </a:t>
             </a:r>
           </a:p>
           <a:p>
@@ -3853,27 +3785,27 @@
               <a:t>Software </a:t>
             </a:r>
             <a:r>
-              <a:rPr lang="es-ES" dirty="0" err="1" smtClean="0"/>
+              <a:rPr lang="es-ES" dirty="0" err="1"/>
               <a:t>Classes</a:t>
             </a:r>
             <a:r>
-              <a:rPr lang="es-ES" dirty="0" smtClean="0"/>
+              <a:rPr lang="es-ES" dirty="0"/>
               <a:t> (</a:t>
             </a:r>
             <a:r>
-              <a:rPr lang="es-ES" dirty="0" err="1" smtClean="0"/>
+              <a:rPr lang="es-ES" dirty="0" err="1"/>
               <a:t>with</a:t>
             </a:r>
             <a:r>
-              <a:rPr lang="es-ES" dirty="0" smtClean="0"/>
+              <a:rPr lang="es-ES" dirty="0"/>
               <a:t> </a:t>
             </a:r>
             <a:r>
-              <a:rPr lang="es-ES" dirty="0" err="1" smtClean="0"/>
+              <a:rPr lang="es-ES" dirty="0" err="1"/>
               <a:t>JavaFX</a:t>
             </a:r>
             <a:r>
-              <a:rPr lang="es-ES" dirty="0" smtClean="0"/>
+              <a:rPr lang="es-ES" dirty="0"/>
               <a:t>)</a:t>
             </a:r>
             <a:endParaRPr lang="en-US" dirty="0"/>
@@ -3902,8 +3834,8 @@
         </p:blipFill>
         <p:spPr>
           <a:xfrm>
-            <a:off x="772733" y="909381"/>
-            <a:ext cx="9800822" cy="5854582"/>
+            <a:off x="1286825" y="940552"/>
+            <a:ext cx="9618349" cy="5917448"/>
           </a:xfrm>
           <a:prstGeom prst="rect">
             <a:avLst/>
@@ -3966,27 +3898,27 @@
               <a:t>Software </a:t>
             </a:r>
             <a:r>
-              <a:rPr lang="es-ES" dirty="0" err="1" smtClean="0"/>
+              <a:rPr lang="es-ES" dirty="0" err="1"/>
               <a:t>Classes</a:t>
             </a:r>
             <a:r>
-              <a:rPr lang="es-ES" dirty="0" smtClean="0"/>
+              <a:rPr lang="es-ES" dirty="0"/>
               <a:t> (</a:t>
             </a:r>
             <a:r>
-              <a:rPr lang="es-ES" dirty="0" err="1" smtClean="0"/>
+              <a:rPr lang="es-ES" dirty="0" err="1"/>
               <a:t>with</a:t>
             </a:r>
             <a:r>
-              <a:rPr lang="es-ES" dirty="0" smtClean="0"/>
+              <a:rPr lang="es-ES" dirty="0"/>
               <a:t> </a:t>
             </a:r>
             <a:r>
-              <a:rPr lang="es-ES" dirty="0" err="1" smtClean="0"/>
+              <a:rPr lang="es-ES" dirty="0" err="1"/>
               <a:t>console</a:t>
             </a:r>
             <a:r>
-              <a:rPr lang="es-ES" dirty="0" smtClean="0"/>
+              <a:rPr lang="es-ES" dirty="0"/>
               <a:t>)</a:t>
             </a:r>
             <a:endParaRPr lang="en-US" dirty="0"/>
@@ -3995,7 +3927,7 @@
       </p:sp>
       <p:pic>
         <p:nvPicPr>
-          <p:cNvPr id="4" name="Picture 3"/>
+          <p:cNvPr id="3" name="Picture 2"/>
           <p:cNvPicPr>
             <a:picLocks noChangeAspect="1"/>
           </p:cNvPicPr>
@@ -4015,8 +3947,8 @@
         </p:blipFill>
         <p:spPr>
           <a:xfrm>
-            <a:off x="824248" y="1172462"/>
-            <a:ext cx="10225825" cy="5372508"/>
+            <a:off x="469557" y="832330"/>
+            <a:ext cx="11252886" cy="5827997"/>
           </a:xfrm>
           <a:prstGeom prst="rect">
             <a:avLst/>

</xml_diff>

<commit_message>
Forgot to add Application parent class to analysis
</commit_message>
<xml_diff>
--- a/src/Analysis/AnalysisAndReadMe-2nd iteration.pptx
+++ b/src/Analysis/AnalysisAndReadMe-2nd iteration.pptx
@@ -250,7 +250,7 @@
           <a:p>
             <a:fld id="{F5E23FCC-39EC-48A2-B1E4-4F652D5BAD1A}" type="datetimeFigureOut">
               <a:rPr lang="en-US" smtClean="0"/>
-              <a:t>27-Jan-17</a:t>
+              <a:t>30-Jan-17</a:t>
             </a:fld>
             <a:endParaRPr lang="en-US"/>
           </a:p>
@@ -418,7 +418,7 @@
           <a:p>
             <a:fld id="{F5E23FCC-39EC-48A2-B1E4-4F652D5BAD1A}" type="datetimeFigureOut">
               <a:rPr lang="en-US" smtClean="0"/>
-              <a:t>27-Jan-17</a:t>
+              <a:t>30-Jan-17</a:t>
             </a:fld>
             <a:endParaRPr lang="en-US"/>
           </a:p>
@@ -596,7 +596,7 @@
           <a:p>
             <a:fld id="{F5E23FCC-39EC-48A2-B1E4-4F652D5BAD1A}" type="datetimeFigureOut">
               <a:rPr lang="en-US" smtClean="0"/>
-              <a:t>27-Jan-17</a:t>
+              <a:t>30-Jan-17</a:t>
             </a:fld>
             <a:endParaRPr lang="en-US"/>
           </a:p>
@@ -764,7 +764,7 @@
           <a:p>
             <a:fld id="{F5E23FCC-39EC-48A2-B1E4-4F652D5BAD1A}" type="datetimeFigureOut">
               <a:rPr lang="en-US" smtClean="0"/>
-              <a:t>27-Jan-17</a:t>
+              <a:t>30-Jan-17</a:t>
             </a:fld>
             <a:endParaRPr lang="en-US"/>
           </a:p>
@@ -1009,7 +1009,7 @@
           <a:p>
             <a:fld id="{F5E23FCC-39EC-48A2-B1E4-4F652D5BAD1A}" type="datetimeFigureOut">
               <a:rPr lang="en-US" smtClean="0"/>
-              <a:t>27-Jan-17</a:t>
+              <a:t>30-Jan-17</a:t>
             </a:fld>
             <a:endParaRPr lang="en-US"/>
           </a:p>
@@ -1238,7 +1238,7 @@
           <a:p>
             <a:fld id="{F5E23FCC-39EC-48A2-B1E4-4F652D5BAD1A}" type="datetimeFigureOut">
               <a:rPr lang="en-US" smtClean="0"/>
-              <a:t>27-Jan-17</a:t>
+              <a:t>30-Jan-17</a:t>
             </a:fld>
             <a:endParaRPr lang="en-US"/>
           </a:p>
@@ -1602,7 +1602,7 @@
           <a:p>
             <a:fld id="{F5E23FCC-39EC-48A2-B1E4-4F652D5BAD1A}" type="datetimeFigureOut">
               <a:rPr lang="en-US" smtClean="0"/>
-              <a:t>27-Jan-17</a:t>
+              <a:t>30-Jan-17</a:t>
             </a:fld>
             <a:endParaRPr lang="en-US"/>
           </a:p>
@@ -1719,7 +1719,7 @@
           <a:p>
             <a:fld id="{F5E23FCC-39EC-48A2-B1E4-4F652D5BAD1A}" type="datetimeFigureOut">
               <a:rPr lang="en-US" smtClean="0"/>
-              <a:t>27-Jan-17</a:t>
+              <a:t>30-Jan-17</a:t>
             </a:fld>
             <a:endParaRPr lang="en-US"/>
           </a:p>
@@ -1814,7 +1814,7 @@
           <a:p>
             <a:fld id="{F5E23FCC-39EC-48A2-B1E4-4F652D5BAD1A}" type="datetimeFigureOut">
               <a:rPr lang="en-US" smtClean="0"/>
-              <a:t>27-Jan-17</a:t>
+              <a:t>30-Jan-17</a:t>
             </a:fld>
             <a:endParaRPr lang="en-US"/>
           </a:p>
@@ -2089,7 +2089,7 @@
           <a:p>
             <a:fld id="{F5E23FCC-39EC-48A2-B1E4-4F652D5BAD1A}" type="datetimeFigureOut">
               <a:rPr lang="en-US" smtClean="0"/>
-              <a:t>27-Jan-17</a:t>
+              <a:t>30-Jan-17</a:t>
             </a:fld>
             <a:endParaRPr lang="en-US"/>
           </a:p>
@@ -2341,7 +2341,7 @@
           <a:p>
             <a:fld id="{F5E23FCC-39EC-48A2-B1E4-4F652D5BAD1A}" type="datetimeFigureOut">
               <a:rPr lang="en-US" smtClean="0"/>
-              <a:t>27-Jan-17</a:t>
+              <a:t>30-Jan-17</a:t>
             </a:fld>
             <a:endParaRPr lang="en-US"/>
           </a:p>
@@ -2552,7 +2552,7 @@
           <a:p>
             <a:fld id="{F5E23FCC-39EC-48A2-B1E4-4F652D5BAD1A}" type="datetimeFigureOut">
               <a:rPr lang="en-US" smtClean="0"/>
-              <a:t>27-Jan-17</a:t>
+              <a:t>30-Jan-17</a:t>
             </a:fld>
             <a:endParaRPr lang="en-US"/>
           </a:p>
@@ -3814,7 +3814,7 @@
       </p:sp>
       <p:pic>
         <p:nvPicPr>
-          <p:cNvPr id="4" name="Picture 3"/>
+          <p:cNvPr id="3" name="Picture 2"/>
           <p:cNvPicPr>
             <a:picLocks noChangeAspect="1"/>
           </p:cNvPicPr>
@@ -3834,8 +3834,8 @@
         </p:blipFill>
         <p:spPr>
           <a:xfrm>
-            <a:off x="1286825" y="940552"/>
-            <a:ext cx="9618349" cy="5917448"/>
+            <a:off x="1498408" y="1290416"/>
+            <a:ext cx="9195184" cy="5788593"/>
           </a:xfrm>
           <a:prstGeom prst="rect">
             <a:avLst/>

</xml_diff>